<commit_message>
Added Function and Array to PPT
</commit_message>
<xml_diff>
--- a/JAVASCRPT.pptx
+++ b/JAVASCRPT.pptx
@@ -5,7 +5,7 @@
     <p:sldMasterId id="2147483648" r:id="rId1"/>
   </p:sldMasterIdLst>
   <p:notesMasterIdLst>
-    <p:notesMasterId r:id="rId13"/>
+    <p:notesMasterId r:id="rId17"/>
   </p:notesMasterIdLst>
   <p:sldIdLst>
     <p:sldId id="256" r:id="rId2"/>
@@ -19,6 +19,10 @@
     <p:sldId id="268" r:id="rId10"/>
     <p:sldId id="267" r:id="rId11"/>
     <p:sldId id="270" r:id="rId12"/>
+    <p:sldId id="271" r:id="rId13"/>
+    <p:sldId id="272" r:id="rId14"/>
+    <p:sldId id="273" r:id="rId15"/>
+    <p:sldId id="274" r:id="rId16"/>
   </p:sldIdLst>
   <p:sldSz cx="12192000" cy="6858000"/>
   <p:notesSz cx="6858000" cy="9144000"/>
@@ -117,6 +121,11 @@
       </a:defRPr>
     </a:lvl9pPr>
   </p:defaultTextStyle>
+  <p:extLst>
+    <p:ext uri="{EFAFB233-063F-42B5-8137-9DF3F51BA10A}">
+      <p15:sldGuideLst xmlns:p15="http://schemas.microsoft.com/office/powerpoint/2012/main"/>
+    </p:ext>
+  </p:extLst>
 </p:presentation>
 </file>
 
@@ -202,7 +211,7 @@
           <a:p>
             <a:fld id="{DE0BE5F6-1CE5-47B2-AC82-947CAA6A2CE5}" type="datetimeFigureOut">
               <a:rPr lang="en-IN" smtClean="0"/>
-              <a:t>01-06-2019</a:t>
+              <a:t>03-06-2019</a:t>
             </a:fld>
             <a:endParaRPr lang="en-IN"/>
           </a:p>
@@ -908,7 +917,7 @@
           <a:p>
             <a:fld id="{4AAD347D-5ACD-4C99-B74B-A9C85AD731AF}" type="datetimeFigureOut">
               <a:rPr lang="en-US" dirty="0"/>
-              <a:t>6/1/2019</a:t>
+              <a:t>6/3/2019</a:t>
             </a:fld>
             <a:endParaRPr lang="en-US" dirty="0"/>
           </a:p>
@@ -1178,7 +1187,7 @@
           <a:p>
             <a:fld id="{4509A250-FF31-4206-8172-F9D3106AACB1}" type="datetimeFigureOut">
               <a:rPr lang="en-US" dirty="0"/>
-              <a:t>6/1/2019</a:t>
+              <a:t>6/3/2019</a:t>
             </a:fld>
             <a:endParaRPr lang="en-US" dirty="0"/>
           </a:p>
@@ -1367,7 +1376,7 @@
           <a:p>
             <a:fld id="{4509A250-FF31-4206-8172-F9D3106AACB1}" type="datetimeFigureOut">
               <a:rPr lang="en-US" dirty="0"/>
-              <a:t>6/1/2019</a:t>
+              <a:t>6/3/2019</a:t>
             </a:fld>
             <a:endParaRPr lang="en-US" dirty="0"/>
           </a:p>
@@ -1635,7 +1644,7 @@
           <a:p>
             <a:fld id="{4509A250-FF31-4206-8172-F9D3106AACB1}" type="datetimeFigureOut">
               <a:rPr lang="en-US" dirty="0"/>
-              <a:t>6/1/2019</a:t>
+              <a:t>6/3/2019</a:t>
             </a:fld>
             <a:endParaRPr lang="en-US" dirty="0"/>
           </a:p>
@@ -1971,7 +1980,7 @@
           <a:p>
             <a:fld id="{4509A250-FF31-4206-8172-F9D3106AACB1}" type="datetimeFigureOut">
               <a:rPr lang="en-US" dirty="0"/>
-              <a:t>6/1/2019</a:t>
+              <a:t>6/3/2019</a:t>
             </a:fld>
             <a:endParaRPr lang="en-US" dirty="0"/>
           </a:p>
@@ -2589,7 +2598,7 @@
           <a:p>
             <a:fld id="{4509A250-FF31-4206-8172-F9D3106AACB1}" type="datetimeFigureOut">
               <a:rPr lang="en-US" dirty="0"/>
-              <a:t>6/1/2019</a:t>
+              <a:t>6/3/2019</a:t>
             </a:fld>
             <a:endParaRPr lang="en-US" dirty="0"/>
           </a:p>
@@ -3444,7 +3453,7 @@
           <a:p>
             <a:fld id="{4509A250-FF31-4206-8172-F9D3106AACB1}" type="datetimeFigureOut">
               <a:rPr lang="en-US" dirty="0"/>
-              <a:t>6/1/2019</a:t>
+              <a:t>6/3/2019</a:t>
             </a:fld>
             <a:endParaRPr lang="en-US" dirty="0"/>
           </a:p>
@@ -3609,7 +3618,7 @@
           <a:p>
             <a:fld id="{4509A250-FF31-4206-8172-F9D3106AACB1}" type="datetimeFigureOut">
               <a:rPr lang="en-US" dirty="0"/>
-              <a:t>6/1/2019</a:t>
+              <a:t>6/3/2019</a:t>
             </a:fld>
             <a:endParaRPr lang="en-US" dirty="0"/>
           </a:p>
@@ -3784,7 +3793,7 @@
           <a:p>
             <a:fld id="{4509A250-FF31-4206-8172-F9D3106AACB1}" type="datetimeFigureOut">
               <a:rPr lang="en-US" dirty="0"/>
-              <a:t>6/1/2019</a:t>
+              <a:t>6/3/2019</a:t>
             </a:fld>
             <a:endParaRPr lang="en-US" dirty="0"/>
           </a:p>
@@ -3949,7 +3958,7 @@
           <a:p>
             <a:fld id="{4509A250-FF31-4206-8172-F9D3106AACB1}" type="datetimeFigureOut">
               <a:rPr lang="en-US" dirty="0"/>
-              <a:t>6/1/2019</a:t>
+              <a:t>6/3/2019</a:t>
             </a:fld>
             <a:endParaRPr lang="en-US" dirty="0"/>
           </a:p>
@@ -4191,7 +4200,7 @@
           <a:p>
             <a:fld id="{9796027F-7875-4030-9381-8BD8C4F21935}" type="datetimeFigureOut">
               <a:rPr lang="en-US" dirty="0"/>
-              <a:t>6/1/2019</a:t>
+              <a:t>6/3/2019</a:t>
             </a:fld>
             <a:endParaRPr lang="en-US" dirty="0"/>
           </a:p>
@@ -4478,7 +4487,7 @@
           <a:p>
             <a:fld id="{9796027F-7875-4030-9381-8BD8C4F21935}" type="datetimeFigureOut">
               <a:rPr lang="en-US" dirty="0"/>
-              <a:t>6/1/2019</a:t>
+              <a:t>6/3/2019</a:t>
             </a:fld>
             <a:endParaRPr lang="en-US" dirty="0"/>
           </a:p>
@@ -4917,7 +4926,7 @@
           <a:p>
             <a:fld id="{9796027F-7875-4030-9381-8BD8C4F21935}" type="datetimeFigureOut">
               <a:rPr lang="en-US" dirty="0"/>
-              <a:t>6/1/2019</a:t>
+              <a:t>6/3/2019</a:t>
             </a:fld>
             <a:endParaRPr lang="en-US" dirty="0"/>
           </a:p>
@@ -5030,7 +5039,7 @@
           <a:p>
             <a:fld id="{4509A250-FF31-4206-8172-F9D3106AACB1}" type="datetimeFigureOut">
               <a:rPr lang="en-US" dirty="0"/>
-              <a:t>6/1/2019</a:t>
+              <a:t>6/3/2019</a:t>
             </a:fld>
             <a:endParaRPr lang="en-US" dirty="0"/>
           </a:p>
@@ -5120,7 +5129,7 @@
           <a:p>
             <a:fld id="{4509A250-FF31-4206-8172-F9D3106AACB1}" type="datetimeFigureOut">
               <a:rPr lang="en-US" dirty="0"/>
-              <a:t>6/1/2019</a:t>
+              <a:t>6/3/2019</a:t>
             </a:fld>
             <a:endParaRPr lang="en-US" dirty="0"/>
           </a:p>
@@ -5394,7 +5403,7 @@
           <a:p>
             <a:fld id="{4509A250-FF31-4206-8172-F9D3106AACB1}" type="datetimeFigureOut">
               <a:rPr lang="en-US" dirty="0"/>
-              <a:t>6/1/2019</a:t>
+              <a:t>6/3/2019</a:t>
             </a:fld>
             <a:endParaRPr lang="en-US" dirty="0"/>
           </a:p>
@@ -5664,7 +5673,7 @@
           <a:p>
             <a:fld id="{4509A250-FF31-4206-8172-F9D3106AACB1}" type="datetimeFigureOut">
               <a:rPr lang="en-US" dirty="0"/>
-              <a:t>6/1/2019</a:t>
+              <a:t>6/3/2019</a:t>
             </a:fld>
             <a:endParaRPr lang="en-US" dirty="0"/>
           </a:p>
@@ -6088,7 +6097,7 @@
           <a:p>
             <a:fld id="{4AAD347D-5ACD-4C99-B74B-A9C85AD731AF}" type="datetimeFigureOut">
               <a:rPr lang="en-US" dirty="0"/>
-              <a:t>6/1/2019</a:t>
+              <a:t>6/3/2019</a:t>
             </a:fld>
             <a:endParaRPr lang="en-US" dirty="0"/>
           </a:p>
@@ -6617,7 +6626,7 @@
           <p:cNvPr id="2" name="Title 1">
             <a:extLst>
               <a:ext uri="{FF2B5EF4-FFF2-40B4-BE49-F238E27FC236}">
-                <a16:creationId xmlns:a16="http://schemas.microsoft.com/office/drawing/2014/main" id="{EED1A5FB-A536-498F-80D4-0B88DAA9B6F0}"/>
+                <a16:creationId xmlns:a16="http://schemas.microsoft.com/office/drawing/2014/main" xmlns="" id="{EED1A5FB-A536-498F-80D4-0B88DAA9B6F0}"/>
               </a:ext>
             </a:extLst>
           </p:cNvPr>
@@ -6650,7 +6659,7 @@
           <p:cNvPr id="3" name="Subtitle 2">
             <a:extLst>
               <a:ext uri="{FF2B5EF4-FFF2-40B4-BE49-F238E27FC236}">
-                <a16:creationId xmlns:a16="http://schemas.microsoft.com/office/drawing/2014/main" id="{6B4A7F6D-81FB-42E3-B5D2-E648F04A0A97}"/>
+                <a16:creationId xmlns:a16="http://schemas.microsoft.com/office/drawing/2014/main" xmlns="" id="{6B4A7F6D-81FB-42E3-B5D2-E648F04A0A97}"/>
               </a:ext>
             </a:extLst>
           </p:cNvPr>
@@ -6708,7 +6717,7 @@
           <p:cNvPr id="2" name="Title 1">
             <a:extLst>
               <a:ext uri="{FF2B5EF4-FFF2-40B4-BE49-F238E27FC236}">
-                <a16:creationId xmlns:a16="http://schemas.microsoft.com/office/drawing/2014/main" id="{4DDB0165-A002-491A-A4DD-9CDBF64BB5EE}"/>
+                <a16:creationId xmlns:a16="http://schemas.microsoft.com/office/drawing/2014/main" xmlns="" id="{4DDB0165-A002-491A-A4DD-9CDBF64BB5EE}"/>
               </a:ext>
             </a:extLst>
           </p:cNvPr>
@@ -6741,7 +6750,7 @@
           <p:cNvPr id="6" name="Content Placeholder 5">
             <a:extLst>
               <a:ext uri="{FF2B5EF4-FFF2-40B4-BE49-F238E27FC236}">
-                <a16:creationId xmlns:a16="http://schemas.microsoft.com/office/drawing/2014/main" id="{5FF32F35-E962-45F5-9594-1820B90E6E5C}"/>
+                <a16:creationId xmlns:a16="http://schemas.microsoft.com/office/drawing/2014/main" xmlns="" id="{5FF32F35-E962-45F5-9594-1820B90E6E5C}"/>
               </a:ext>
             </a:extLst>
           </p:cNvPr>
@@ -6964,7 +6973,7 @@
           <p:cNvPr id="2" name="Title 1">
             <a:extLst>
               <a:ext uri="{FF2B5EF4-FFF2-40B4-BE49-F238E27FC236}">
-                <a16:creationId xmlns:a16="http://schemas.microsoft.com/office/drawing/2014/main" id="{0FD3A787-C7DD-44D2-9981-6FAF85B239EE}"/>
+                <a16:creationId xmlns:a16="http://schemas.microsoft.com/office/drawing/2014/main" xmlns="" id="{0FD3A787-C7DD-44D2-9981-6FAF85B239EE}"/>
               </a:ext>
             </a:extLst>
           </p:cNvPr>
@@ -7000,6 +7009,10 @@
               </a:rPr>
               <a:t>switch case is an alternate method of if-else statement</a:t>
             </a:r>
+            <a:r>
+              <a:rPr lang="en-US" dirty="0"/>
+              <a:t/>
+            </a:r>
             <a:br>
               <a:rPr lang="en-US" dirty="0"/>
             </a:br>
@@ -7012,7 +7025,7 @@
           <p:cNvPr id="3" name="Text Placeholder 2">
             <a:extLst>
               <a:ext uri="{FF2B5EF4-FFF2-40B4-BE49-F238E27FC236}">
-                <a16:creationId xmlns:a16="http://schemas.microsoft.com/office/drawing/2014/main" id="{32FEDD3C-8579-447A-BE3B-30254F109E35}"/>
+                <a16:creationId xmlns:a16="http://schemas.microsoft.com/office/drawing/2014/main" xmlns="" id="{32FEDD3C-8579-447A-BE3B-30254F109E35}"/>
               </a:ext>
             </a:extLst>
           </p:cNvPr>
@@ -7045,7 +7058,7 @@
           <p:cNvPr id="5" name="Text Placeholder 4">
             <a:extLst>
               <a:ext uri="{FF2B5EF4-FFF2-40B4-BE49-F238E27FC236}">
-                <a16:creationId xmlns:a16="http://schemas.microsoft.com/office/drawing/2014/main" id="{066F2718-7312-4C00-92FB-D79349508FAC}"/>
+                <a16:creationId xmlns:a16="http://schemas.microsoft.com/office/drawing/2014/main" xmlns="" id="{066F2718-7312-4C00-92FB-D79349508FAC}"/>
               </a:ext>
             </a:extLst>
           </p:cNvPr>
@@ -7078,7 +7091,7 @@
           <p:cNvPr id="6" name="Content Placeholder 5">
             <a:extLst>
               <a:ext uri="{FF2B5EF4-FFF2-40B4-BE49-F238E27FC236}">
-                <a16:creationId xmlns:a16="http://schemas.microsoft.com/office/drawing/2014/main" id="{83372F51-5CC7-4820-83C3-AB847CAB19B1}"/>
+                <a16:creationId xmlns:a16="http://schemas.microsoft.com/office/drawing/2014/main" xmlns="" id="{83372F51-5CC7-4820-83C3-AB847CAB19B1}"/>
               </a:ext>
             </a:extLst>
           </p:cNvPr>
@@ -7117,7 +7130,7 @@
           <p:cNvPr id="9" name="Content Placeholder 8">
             <a:extLst>
               <a:ext uri="{FF2B5EF4-FFF2-40B4-BE49-F238E27FC236}">
-                <a16:creationId xmlns:a16="http://schemas.microsoft.com/office/drawing/2014/main" id="{6F493DB7-75F4-4AC9-93A7-041BBE0D4068}"/>
+                <a16:creationId xmlns:a16="http://schemas.microsoft.com/office/drawing/2014/main" xmlns="" id="{6F493DB7-75F4-4AC9-93A7-041BBE0D4068}"/>
               </a:ext>
             </a:extLst>
           </p:cNvPr>
@@ -7156,7 +7169,7 @@
           <p:cNvPr id="10" name="Picture 9">
             <a:extLst>
               <a:ext uri="{FF2B5EF4-FFF2-40B4-BE49-F238E27FC236}">
-                <a16:creationId xmlns:a16="http://schemas.microsoft.com/office/drawing/2014/main" id="{B2A08A5B-8D18-4B9B-896B-448058A8896B}"/>
+                <a16:creationId xmlns:a16="http://schemas.microsoft.com/office/drawing/2014/main" xmlns="" id="{B2A08A5B-8D18-4B9B-896B-448058A8896B}"/>
               </a:ext>
             </a:extLst>
           </p:cNvPr>
@@ -7186,7 +7199,7 @@
           <p:cNvPr id="12" name="Picture 11">
             <a:extLst>
               <a:ext uri="{FF2B5EF4-FFF2-40B4-BE49-F238E27FC236}">
-                <a16:creationId xmlns:a16="http://schemas.microsoft.com/office/drawing/2014/main" id="{35E41823-9FB9-4E65-9D20-0656836974DD}"/>
+                <a16:creationId xmlns:a16="http://schemas.microsoft.com/office/drawing/2014/main" xmlns="" id="{35E41823-9FB9-4E65-9D20-0656836974DD}"/>
               </a:ext>
             </a:extLst>
           </p:cNvPr>
@@ -7221,6 +7234,646 @@
   <p:clrMapOvr>
     <a:masterClrMapping/>
   </p:clrMapOvr>
+</p:sld>
+</file>
+
+<file path=ppt/slides/slide12.xml><?xml version="1.0" encoding="utf-8"?>
+<p:sld xmlns:a="http://schemas.openxmlformats.org/drawingml/2006/main" xmlns:r="http://schemas.openxmlformats.org/officeDocument/2006/relationships" xmlns:p="http://schemas.openxmlformats.org/presentationml/2006/main">
+  <p:cSld>
+    <p:spTree>
+      <p:nvGrpSpPr>
+        <p:cNvPr id="1" name=""/>
+        <p:cNvGrpSpPr/>
+        <p:nvPr/>
+      </p:nvGrpSpPr>
+      <p:grpSpPr>
+        <a:xfrm>
+          <a:off x="0" y="0"/>
+          <a:ext cx="0" cy="0"/>
+          <a:chOff x="0" y="0"/>
+          <a:chExt cx="0" cy="0"/>
+        </a:xfrm>
+      </p:grpSpPr>
+      <p:sp>
+        <p:nvSpPr>
+          <p:cNvPr id="2" name="Title 1"/>
+          <p:cNvSpPr>
+            <a:spLocks noGrp="1"/>
+          </p:cNvSpPr>
+          <p:nvPr>
+            <p:ph type="title"/>
+          </p:nvPr>
+        </p:nvSpPr>
+        <p:spPr>
+          <a:xfrm>
+            <a:off x="646111" y="452718"/>
+            <a:ext cx="9404723" cy="715682"/>
+          </a:xfrm>
+        </p:spPr>
+        <p:txBody>
+          <a:bodyPr/>
+          <a:lstStyle/>
+          <a:p>
+            <a:r>
+              <a:rPr lang="en-US" dirty="0" smtClean="0"/>
+              <a:t>Function</a:t>
+            </a:r>
+            <a:endParaRPr lang="en-US" dirty="0"/>
+          </a:p>
+        </p:txBody>
+      </p:sp>
+      <p:sp>
+        <p:nvSpPr>
+          <p:cNvPr id="3" name="Content Placeholder 2"/>
+          <p:cNvSpPr>
+            <a:spLocks noGrp="1"/>
+          </p:cNvSpPr>
+          <p:nvPr>
+            <p:ph idx="1"/>
+          </p:nvPr>
+        </p:nvSpPr>
+        <p:spPr>
+          <a:xfrm>
+            <a:off x="646112" y="1168400"/>
+            <a:ext cx="9403742" cy="5079999"/>
+          </a:xfrm>
+        </p:spPr>
+        <p:txBody>
+          <a:bodyPr/>
+          <a:lstStyle/>
+          <a:p>
+            <a:r>
+              <a:rPr lang="en-US" dirty="0" smtClean="0"/>
+              <a:t>In JavaScript you can declare a function in FOUR ways</a:t>
+            </a:r>
+          </a:p>
+          <a:p>
+            <a:pPr marL="0" indent="0">
+              <a:buNone/>
+            </a:pPr>
+            <a:endParaRPr lang="en-US" dirty="0" smtClean="0"/>
+          </a:p>
+          <a:p>
+            <a:pPr lvl="1"/>
+            <a:r>
+              <a:rPr lang="en-US" dirty="0" smtClean="0"/>
+              <a:t>Normal Function                   </a:t>
+            </a:r>
+            <a:r>
+              <a:rPr lang="en-US" b="1" dirty="0" err="1" smtClean="0">
+                <a:solidFill>
+                  <a:srgbClr val="FFFF00"/>
+                </a:solidFill>
+              </a:rPr>
+              <a:t>function</a:t>
+            </a:r>
+            <a:r>
+              <a:rPr lang="en-US" b="1" dirty="0" smtClean="0">
+                <a:solidFill>
+                  <a:srgbClr val="FFFF00"/>
+                </a:solidFill>
+              </a:rPr>
+              <a:t>  </a:t>
+            </a:r>
+            <a:r>
+              <a:rPr lang="en-US" b="1" dirty="0">
+                <a:solidFill>
+                  <a:srgbClr val="FFFF00"/>
+                </a:solidFill>
+              </a:rPr>
+              <a:t>&lt;function name&gt;(){ body}</a:t>
+            </a:r>
+          </a:p>
+          <a:p>
+            <a:pPr marL="457200" lvl="1" indent="0">
+              <a:buNone/>
+            </a:pPr>
+            <a:endParaRPr lang="en-US" dirty="0" smtClean="0"/>
+          </a:p>
+          <a:p>
+            <a:pPr lvl="1"/>
+            <a:r>
+              <a:rPr lang="en-US" dirty="0" smtClean="0"/>
+              <a:t>Function Expression              </a:t>
+            </a:r>
+            <a:r>
+              <a:rPr lang="en-US" b="1" dirty="0">
+                <a:solidFill>
+                  <a:srgbClr val="FFFF00"/>
+                </a:solidFill>
+              </a:rPr>
+              <a:t>const &lt;name&gt; = function(){ body }</a:t>
+            </a:r>
+          </a:p>
+          <a:p>
+            <a:pPr lvl="1"/>
+            <a:r>
+              <a:rPr lang="en-US" dirty="0" smtClean="0"/>
+              <a:t>Arrow Function                     </a:t>
+            </a:r>
+            <a:r>
+              <a:rPr lang="en-US" b="1" dirty="0">
+                <a:solidFill>
+                  <a:srgbClr val="FFFF00"/>
+                </a:solidFill>
+              </a:rPr>
+              <a:t>const &lt;name&gt; = () =&gt; { body }</a:t>
+            </a:r>
+          </a:p>
+          <a:p>
+            <a:pPr lvl="1"/>
+            <a:r>
+              <a:rPr lang="en-US" dirty="0" smtClean="0"/>
+              <a:t>Concise Arrow Function      </a:t>
+            </a:r>
+            <a:r>
+              <a:rPr lang="en-US" b="1" dirty="0">
+                <a:solidFill>
+                  <a:srgbClr val="FFFF00"/>
+                </a:solidFill>
+              </a:rPr>
+              <a:t>const &lt;name&gt; = single parameter =&gt; single line</a:t>
+            </a:r>
+            <a:r>
+              <a:rPr lang="en-US" dirty="0"/>
+              <a:t> </a:t>
+            </a:r>
+            <a:r>
+              <a:rPr lang="en-US" dirty="0" smtClean="0"/>
+              <a:t>body </a:t>
+            </a:r>
+          </a:p>
+          <a:p>
+            <a:pPr marL="457200" lvl="1" indent="0">
+              <a:buNone/>
+            </a:pPr>
+            <a:endParaRPr lang="en-US" dirty="0" smtClean="0"/>
+          </a:p>
+          <a:p>
+            <a:pPr marL="457200" lvl="1" indent="0">
+              <a:buNone/>
+            </a:pPr>
+            <a:r>
+              <a:rPr lang="en-US" dirty="0" smtClean="0"/>
+              <a:t>Basically arrow function method is the advanced version of Function expression and Concise Arrow is the special condition of arrow function where you have a single parameter and one line return statement/function body.</a:t>
+            </a:r>
+            <a:endParaRPr lang="en-US" dirty="0"/>
+          </a:p>
+        </p:txBody>
+      </p:sp>
+    </p:spTree>
+    <p:extLst>
+      <p:ext uri="{BB962C8B-B14F-4D97-AF65-F5344CB8AC3E}">
+        <p14:creationId xmlns:p14="http://schemas.microsoft.com/office/powerpoint/2010/main" val="1750439011"/>
+      </p:ext>
+    </p:extLst>
+  </p:cSld>
+  <p:clrMapOvr>
+    <a:masterClrMapping/>
+  </p:clrMapOvr>
+</p:sld>
+</file>
+
+<file path=ppt/slides/slide13.xml><?xml version="1.0" encoding="utf-8"?>
+<p:sld xmlns:a="http://schemas.openxmlformats.org/drawingml/2006/main" xmlns:r="http://schemas.openxmlformats.org/officeDocument/2006/relationships" xmlns:p="http://schemas.openxmlformats.org/presentationml/2006/main">
+  <p:cSld>
+    <p:spTree>
+      <p:nvGrpSpPr>
+        <p:cNvPr id="1" name=""/>
+        <p:cNvGrpSpPr/>
+        <p:nvPr/>
+      </p:nvGrpSpPr>
+      <p:grpSpPr>
+        <a:xfrm>
+          <a:off x="0" y="0"/>
+          <a:ext cx="0" cy="0"/>
+          <a:chOff x="0" y="0"/>
+          <a:chExt cx="0" cy="0"/>
+        </a:xfrm>
+      </p:grpSpPr>
+      <p:pic>
+        <p:nvPicPr>
+          <p:cNvPr id="2" name="Picture 1"/>
+          <p:cNvPicPr/>
+          <p:nvPr/>
+        </p:nvPicPr>
+        <p:blipFill>
+          <a:blip r:embed="rId2"/>
+          <a:stretch>
+            <a:fillRect/>
+          </a:stretch>
+        </p:blipFill>
+        <p:spPr>
+          <a:xfrm>
+            <a:off x="863600" y="825500"/>
+            <a:ext cx="8775700" cy="5283200"/>
+          </a:xfrm>
+          <a:prstGeom prst="rect">
+            <a:avLst/>
+          </a:prstGeom>
+        </p:spPr>
+      </p:pic>
+    </p:spTree>
+    <p:extLst>
+      <p:ext uri="{BB962C8B-B14F-4D97-AF65-F5344CB8AC3E}">
+        <p14:creationId xmlns:p14="http://schemas.microsoft.com/office/powerpoint/2010/main" val="2321030324"/>
+      </p:ext>
+    </p:extLst>
+  </p:cSld>
+  <p:clrMapOvr>
+    <a:masterClrMapping/>
+  </p:clrMapOvr>
+  <p:timing>
+    <p:tnLst>
+      <p:par>
+        <p:cTn id="1" dur="indefinite" restart="never" nodeType="tmRoot"/>
+      </p:par>
+    </p:tnLst>
+  </p:timing>
+</p:sld>
+</file>
+
+<file path=ppt/slides/slide14.xml><?xml version="1.0" encoding="utf-8"?>
+<p:sld xmlns:a="http://schemas.openxmlformats.org/drawingml/2006/main" xmlns:r="http://schemas.openxmlformats.org/officeDocument/2006/relationships" xmlns:p="http://schemas.openxmlformats.org/presentationml/2006/main">
+  <p:cSld>
+    <p:spTree>
+      <p:nvGrpSpPr>
+        <p:cNvPr id="1" name=""/>
+        <p:cNvGrpSpPr/>
+        <p:nvPr/>
+      </p:nvGrpSpPr>
+      <p:grpSpPr>
+        <a:xfrm>
+          <a:off x="0" y="0"/>
+          <a:ext cx="0" cy="0"/>
+          <a:chOff x="0" y="0"/>
+          <a:chExt cx="0" cy="0"/>
+        </a:xfrm>
+      </p:grpSpPr>
+      <p:sp>
+        <p:nvSpPr>
+          <p:cNvPr id="2" name="Title 1"/>
+          <p:cNvSpPr>
+            <a:spLocks noGrp="1"/>
+          </p:cNvSpPr>
+          <p:nvPr>
+            <p:ph type="title"/>
+          </p:nvPr>
+        </p:nvSpPr>
+        <p:spPr>
+          <a:xfrm>
+            <a:off x="646111" y="452718"/>
+            <a:ext cx="9404723" cy="639482"/>
+          </a:xfrm>
+        </p:spPr>
+        <p:txBody>
+          <a:bodyPr/>
+          <a:lstStyle/>
+          <a:p>
+            <a:r>
+              <a:rPr lang="en-US" dirty="0" smtClean="0"/>
+              <a:t>Arrays</a:t>
+            </a:r>
+            <a:endParaRPr lang="en-US" dirty="0"/>
+          </a:p>
+        </p:txBody>
+      </p:sp>
+      <p:sp>
+        <p:nvSpPr>
+          <p:cNvPr id="3" name="Content Placeholder 2"/>
+          <p:cNvSpPr>
+            <a:spLocks noGrp="1"/>
+          </p:cNvSpPr>
+          <p:nvPr>
+            <p:ph idx="1"/>
+          </p:nvPr>
+        </p:nvSpPr>
+        <p:spPr>
+          <a:xfrm>
+            <a:off x="546100" y="1371600"/>
+            <a:ext cx="9503753" cy="4876799"/>
+          </a:xfrm>
+        </p:spPr>
+        <p:txBody>
+          <a:bodyPr/>
+          <a:lstStyle/>
+          <a:p>
+            <a:r>
+              <a:rPr lang="en-US" dirty="0" smtClean="0"/>
+              <a:t>Arrays are the JS ways of creating list.</a:t>
+            </a:r>
+          </a:p>
+          <a:p>
+            <a:r>
+              <a:rPr lang="en-US" dirty="0" err="1" smtClean="0"/>
+              <a:t>Arryas</a:t>
+            </a:r>
+            <a:r>
+              <a:rPr lang="en-US" dirty="0" smtClean="0"/>
+              <a:t> can store any </a:t>
+            </a:r>
+            <a:r>
+              <a:rPr lang="en-US" dirty="0" err="1" smtClean="0"/>
+              <a:t>datatype</a:t>
+            </a:r>
+            <a:r>
+              <a:rPr lang="en-US" dirty="0" smtClean="0"/>
+              <a:t> .</a:t>
+            </a:r>
+          </a:p>
+          <a:p>
+            <a:r>
+              <a:rPr lang="en-US" dirty="0"/>
+              <a:t>You can declare an array using either </a:t>
+            </a:r>
+            <a:r>
+              <a:rPr lang="en-US" dirty="0">
+                <a:solidFill>
+                  <a:srgbClr val="FFFF00"/>
+                </a:solidFill>
+              </a:rPr>
+              <a:t>const </a:t>
+            </a:r>
+            <a:r>
+              <a:rPr lang="en-US" dirty="0"/>
+              <a:t>or </a:t>
+            </a:r>
+            <a:r>
+              <a:rPr lang="en-US" dirty="0">
+                <a:solidFill>
+                  <a:srgbClr val="FFFF00"/>
+                </a:solidFill>
+              </a:rPr>
+              <a:t>let</a:t>
+            </a:r>
+            <a:r>
+              <a:rPr lang="en-US" dirty="0"/>
+              <a:t> but therein const although you can replace the elements of array you can’t create a new array with same name.</a:t>
+            </a:r>
+          </a:p>
+          <a:p>
+            <a:endParaRPr lang="en-US" dirty="0"/>
+          </a:p>
+        </p:txBody>
+      </p:sp>
+      <p:pic>
+        <p:nvPicPr>
+          <p:cNvPr id="4" name="Picture 3"/>
+          <p:cNvPicPr/>
+          <p:nvPr/>
+        </p:nvPicPr>
+        <p:blipFill>
+          <a:blip r:embed="rId2"/>
+          <a:stretch>
+            <a:fillRect/>
+          </a:stretch>
+        </p:blipFill>
+        <p:spPr>
+          <a:xfrm>
+            <a:off x="1003300" y="3543301"/>
+            <a:ext cx="6985000" cy="2705098"/>
+          </a:xfrm>
+          <a:prstGeom prst="rect">
+            <a:avLst/>
+          </a:prstGeom>
+        </p:spPr>
+      </p:pic>
+    </p:spTree>
+    <p:extLst>
+      <p:ext uri="{BB962C8B-B14F-4D97-AF65-F5344CB8AC3E}">
+        <p14:creationId xmlns:p14="http://schemas.microsoft.com/office/powerpoint/2010/main" val="2986948427"/>
+      </p:ext>
+    </p:extLst>
+  </p:cSld>
+  <p:clrMapOvr>
+    <a:masterClrMapping/>
+  </p:clrMapOvr>
+  <p:timing>
+    <p:tnLst>
+      <p:par>
+        <p:cTn id="1" dur="indefinite" restart="never" nodeType="tmRoot"/>
+      </p:par>
+    </p:tnLst>
+  </p:timing>
+</p:sld>
+</file>
+
+<file path=ppt/slides/slide15.xml><?xml version="1.0" encoding="utf-8"?>
+<p:sld xmlns:a="http://schemas.openxmlformats.org/drawingml/2006/main" xmlns:r="http://schemas.openxmlformats.org/officeDocument/2006/relationships" xmlns:p="http://schemas.openxmlformats.org/presentationml/2006/main">
+  <p:cSld>
+    <p:spTree>
+      <p:nvGrpSpPr>
+        <p:cNvPr id="1" name=""/>
+        <p:cNvGrpSpPr/>
+        <p:nvPr/>
+      </p:nvGrpSpPr>
+      <p:grpSpPr>
+        <a:xfrm>
+          <a:off x="0" y="0"/>
+          <a:ext cx="0" cy="0"/>
+          <a:chOff x="0" y="0"/>
+          <a:chExt cx="0" cy="0"/>
+        </a:xfrm>
+      </p:grpSpPr>
+      <p:sp>
+        <p:nvSpPr>
+          <p:cNvPr id="2" name="Title 1"/>
+          <p:cNvSpPr>
+            <a:spLocks noGrp="1"/>
+          </p:cNvSpPr>
+          <p:nvPr>
+            <p:ph type="title"/>
+          </p:nvPr>
+        </p:nvSpPr>
+        <p:spPr>
+          <a:xfrm>
+            <a:off x="646111" y="452718"/>
+            <a:ext cx="9404723" cy="690282"/>
+          </a:xfrm>
+        </p:spPr>
+        <p:txBody>
+          <a:bodyPr/>
+          <a:lstStyle/>
+          <a:p>
+            <a:r>
+              <a:rPr lang="en-US" dirty="0" smtClean="0"/>
+              <a:t>Methods on Array</a:t>
+            </a:r>
+            <a:endParaRPr lang="en-US" dirty="0"/>
+          </a:p>
+        </p:txBody>
+      </p:sp>
+      <p:sp>
+        <p:nvSpPr>
+          <p:cNvPr id="3" name="Content Placeholder 2"/>
+          <p:cNvSpPr>
+            <a:spLocks noGrp="1"/>
+          </p:cNvSpPr>
+          <p:nvPr>
+            <p:ph idx="1"/>
+          </p:nvPr>
+        </p:nvSpPr>
+        <p:spPr>
+          <a:xfrm>
+            <a:off x="646112" y="1384300"/>
+            <a:ext cx="9403742" cy="4864099"/>
+          </a:xfrm>
+        </p:spPr>
+        <p:txBody>
+          <a:bodyPr/>
+          <a:lstStyle/>
+          <a:p>
+            <a:r>
+              <a:rPr lang="en-US" dirty="0" err="1" smtClean="0"/>
+              <a:t>Arraylength</a:t>
+            </a:r>
+            <a:r>
+              <a:rPr lang="en-US" dirty="0" smtClean="0"/>
+              <a:t> = &lt;</a:t>
+            </a:r>
+            <a:r>
+              <a:rPr lang="en-US" dirty="0" err="1" smtClean="0"/>
+              <a:t>arrayname</a:t>
+            </a:r>
+            <a:r>
+              <a:rPr lang="en-US" dirty="0" smtClean="0"/>
+              <a:t>&gt;.length</a:t>
+            </a:r>
+          </a:p>
+          <a:p>
+            <a:r>
+              <a:rPr lang="en-US" smtClean="0"/>
+              <a:t>push </a:t>
+            </a:r>
+            <a:r>
+              <a:rPr lang="en-US" dirty="0" smtClean="0"/>
+              <a:t>= </a:t>
+            </a:r>
+            <a:r>
+              <a:rPr lang="en-US" dirty="0"/>
+              <a:t>&lt;</a:t>
+            </a:r>
+            <a:r>
+              <a:rPr lang="en-US" dirty="0" err="1"/>
+              <a:t>arrayname</a:t>
+            </a:r>
+            <a:r>
+              <a:rPr lang="en-US" dirty="0" smtClean="0"/>
+              <a:t>&gt;.push()</a:t>
+            </a:r>
+          </a:p>
+          <a:p>
+            <a:r>
+              <a:rPr lang="en-US" dirty="0" smtClean="0"/>
+              <a:t>pop = </a:t>
+            </a:r>
+            <a:r>
+              <a:rPr lang="en-US" dirty="0"/>
+              <a:t>&lt;</a:t>
+            </a:r>
+            <a:r>
+              <a:rPr lang="en-US" dirty="0" err="1"/>
+              <a:t>arrayname</a:t>
+            </a:r>
+            <a:r>
+              <a:rPr lang="en-US" dirty="0"/>
+              <a:t>&gt;.</a:t>
+            </a:r>
+            <a:r>
+              <a:rPr lang="en-US" dirty="0" smtClean="0"/>
+              <a:t>pop()</a:t>
+            </a:r>
+          </a:p>
+          <a:p>
+            <a:r>
+              <a:rPr lang="en-US" dirty="0" smtClean="0"/>
+              <a:t>Array Slicing = &lt;</a:t>
+            </a:r>
+            <a:r>
+              <a:rPr lang="en-US" dirty="0" err="1" smtClean="0"/>
+              <a:t>arrayname</a:t>
+            </a:r>
+            <a:r>
+              <a:rPr lang="en-US" dirty="0" smtClean="0"/>
+              <a:t>&gt;.slice(</a:t>
+            </a:r>
+            <a:r>
+              <a:rPr lang="en-US" dirty="0" err="1" smtClean="0"/>
+              <a:t>begin,end</a:t>
+            </a:r>
+            <a:r>
+              <a:rPr lang="en-US" dirty="0"/>
+              <a:t>) </a:t>
+            </a:r>
+          </a:p>
+          <a:p>
+            <a:endParaRPr lang="en-US" dirty="0"/>
+          </a:p>
+        </p:txBody>
+      </p:sp>
+      <p:pic>
+        <p:nvPicPr>
+          <p:cNvPr id="4" name="Picture 3"/>
+          <p:cNvPicPr/>
+          <p:nvPr/>
+        </p:nvPicPr>
+        <p:blipFill>
+          <a:blip r:embed="rId2"/>
+          <a:stretch>
+            <a:fillRect/>
+          </a:stretch>
+        </p:blipFill>
+        <p:spPr>
+          <a:xfrm>
+            <a:off x="990600" y="3467100"/>
+            <a:ext cx="7543800" cy="2362200"/>
+          </a:xfrm>
+          <a:prstGeom prst="rect">
+            <a:avLst/>
+          </a:prstGeom>
+        </p:spPr>
+      </p:pic>
+      <p:pic>
+        <p:nvPicPr>
+          <p:cNvPr id="5" name="Picture 4"/>
+          <p:cNvPicPr>
+            <a:picLocks noChangeAspect="1"/>
+          </p:cNvPicPr>
+          <p:nvPr/>
+        </p:nvPicPr>
+        <p:blipFill>
+          <a:blip r:embed="rId3"/>
+          <a:stretch>
+            <a:fillRect/>
+          </a:stretch>
+        </p:blipFill>
+        <p:spPr>
+          <a:xfrm>
+            <a:off x="6375399" y="1384300"/>
+            <a:ext cx="4787901" cy="1247775"/>
+          </a:xfrm>
+          <a:prstGeom prst="rect">
+            <a:avLst/>
+          </a:prstGeom>
+        </p:spPr>
+      </p:pic>
+    </p:spTree>
+    <p:extLst>
+      <p:ext uri="{BB962C8B-B14F-4D97-AF65-F5344CB8AC3E}">
+        <p14:creationId xmlns:p14="http://schemas.microsoft.com/office/powerpoint/2010/main" val="374657920"/>
+      </p:ext>
+    </p:extLst>
+  </p:cSld>
+  <p:clrMapOvr>
+    <a:masterClrMapping/>
+  </p:clrMapOvr>
+  <p:timing>
+    <p:tnLst>
+      <p:par>
+        <p:cTn id="1" dur="indefinite" restart="never" nodeType="tmRoot"/>
+      </p:par>
+    </p:tnLst>
+  </p:timing>
 </p:sld>
 </file>
 
@@ -7246,7 +7899,7 @@
           <p:cNvPr id="2" name="Title 1">
             <a:extLst>
               <a:ext uri="{FF2B5EF4-FFF2-40B4-BE49-F238E27FC236}">
-                <a16:creationId xmlns:a16="http://schemas.microsoft.com/office/drawing/2014/main" id="{F26B4C22-E571-44B1-86F4-C4F0250F4F2B}"/>
+                <a16:creationId xmlns:a16="http://schemas.microsoft.com/office/drawing/2014/main" xmlns="" id="{F26B4C22-E571-44B1-86F4-C4F0250F4F2B}"/>
               </a:ext>
             </a:extLst>
           </p:cNvPr>
@@ -7274,7 +7927,7 @@
           <p:cNvPr id="3" name="Content Placeholder 2">
             <a:extLst>
               <a:ext uri="{FF2B5EF4-FFF2-40B4-BE49-F238E27FC236}">
-                <a16:creationId xmlns:a16="http://schemas.microsoft.com/office/drawing/2014/main" id="{61FC4E31-6A55-41B1-89DF-569D855AD4BD}"/>
+                <a16:creationId xmlns:a16="http://schemas.microsoft.com/office/drawing/2014/main" xmlns="" id="{61FC4E31-6A55-41B1-89DF-569D855AD4BD}"/>
               </a:ext>
             </a:extLst>
           </p:cNvPr>
@@ -7394,7 +8047,7 @@
           <p:cNvPr id="2" name="Title 1">
             <a:extLst>
               <a:ext uri="{FF2B5EF4-FFF2-40B4-BE49-F238E27FC236}">
-                <a16:creationId xmlns:a16="http://schemas.microsoft.com/office/drawing/2014/main" id="{A396EBC3-14E3-4330-BB08-C5EFE80D354B}"/>
+                <a16:creationId xmlns:a16="http://schemas.microsoft.com/office/drawing/2014/main" xmlns="" id="{A396EBC3-14E3-4330-BB08-C5EFE80D354B}"/>
               </a:ext>
             </a:extLst>
           </p:cNvPr>
@@ -7422,7 +8075,7 @@
           <p:cNvPr id="3" name="Content Placeholder 2">
             <a:extLst>
               <a:ext uri="{FF2B5EF4-FFF2-40B4-BE49-F238E27FC236}">
-                <a16:creationId xmlns:a16="http://schemas.microsoft.com/office/drawing/2014/main" id="{39F28357-4ADC-4E8E-972A-D037BE17766D}"/>
+                <a16:creationId xmlns:a16="http://schemas.microsoft.com/office/drawing/2014/main" xmlns="" id="{39F28357-4ADC-4E8E-972A-D037BE17766D}"/>
               </a:ext>
             </a:extLst>
           </p:cNvPr>
@@ -7478,7 +8131,7 @@
           <p:cNvPr id="5" name="Picture 4">
             <a:extLst>
               <a:ext uri="{FF2B5EF4-FFF2-40B4-BE49-F238E27FC236}">
-                <a16:creationId xmlns:a16="http://schemas.microsoft.com/office/drawing/2014/main" id="{2A14372C-C7AC-4153-9B94-4191393470EA}"/>
+                <a16:creationId xmlns:a16="http://schemas.microsoft.com/office/drawing/2014/main" xmlns="" id="{2A14372C-C7AC-4153-9B94-4191393470EA}"/>
               </a:ext>
             </a:extLst>
           </p:cNvPr>
@@ -7538,7 +8191,7 @@
           <p:cNvPr id="2" name="Title 1">
             <a:extLst>
               <a:ext uri="{FF2B5EF4-FFF2-40B4-BE49-F238E27FC236}">
-                <a16:creationId xmlns:a16="http://schemas.microsoft.com/office/drawing/2014/main" id="{795B23C6-AD0E-42B2-8DDE-3BB25FD36865}"/>
+                <a16:creationId xmlns:a16="http://schemas.microsoft.com/office/drawing/2014/main" xmlns="" id="{795B23C6-AD0E-42B2-8DDE-3BB25FD36865}"/>
               </a:ext>
             </a:extLst>
           </p:cNvPr>
@@ -7571,7 +8224,7 @@
           <p:cNvPr id="3" name="Content Placeholder 2">
             <a:extLst>
               <a:ext uri="{FF2B5EF4-FFF2-40B4-BE49-F238E27FC236}">
-                <a16:creationId xmlns:a16="http://schemas.microsoft.com/office/drawing/2014/main" id="{5A66274A-4820-4530-802C-E80B06CB7289}"/>
+                <a16:creationId xmlns:a16="http://schemas.microsoft.com/office/drawing/2014/main" xmlns="" id="{5A66274A-4820-4530-802C-E80B06CB7289}"/>
               </a:ext>
             </a:extLst>
           </p:cNvPr>
@@ -7602,7 +8255,7 @@
           <p:cNvPr id="4" name="Content Placeholder 3">
             <a:extLst>
               <a:ext uri="{FF2B5EF4-FFF2-40B4-BE49-F238E27FC236}">
-                <a16:creationId xmlns:a16="http://schemas.microsoft.com/office/drawing/2014/main" id="{2CEB8610-17A2-4100-907B-3974551A926D}"/>
+                <a16:creationId xmlns:a16="http://schemas.microsoft.com/office/drawing/2014/main" xmlns="" id="{2CEB8610-17A2-4100-907B-3974551A926D}"/>
               </a:ext>
             </a:extLst>
           </p:cNvPr>
@@ -7630,7 +8283,7 @@
           <p:cNvPr id="5" name="Content Placeholder 3">
             <a:extLst>
               <a:ext uri="{FF2B5EF4-FFF2-40B4-BE49-F238E27FC236}">
-                <a16:creationId xmlns:a16="http://schemas.microsoft.com/office/drawing/2014/main" id="{598C02A6-B7DC-42BC-8D98-5E7D868A85F6}"/>
+                <a16:creationId xmlns:a16="http://schemas.microsoft.com/office/drawing/2014/main" xmlns="" id="{598C02A6-B7DC-42BC-8D98-5E7D868A85F6}"/>
               </a:ext>
             </a:extLst>
           </p:cNvPr>
@@ -7660,7 +8313,7 @@
           <p:cNvPr id="6" name="Picture 5">
             <a:extLst>
               <a:ext uri="{FF2B5EF4-FFF2-40B4-BE49-F238E27FC236}">
-                <a16:creationId xmlns:a16="http://schemas.microsoft.com/office/drawing/2014/main" id="{9EDE9D29-7785-4B23-85B8-56266557B2C6}"/>
+                <a16:creationId xmlns:a16="http://schemas.microsoft.com/office/drawing/2014/main" xmlns="" id="{9EDE9D29-7785-4B23-85B8-56266557B2C6}"/>
               </a:ext>
             </a:extLst>
           </p:cNvPr>
@@ -7720,7 +8373,7 @@
           <p:cNvPr id="2" name="Title 1">
             <a:extLst>
               <a:ext uri="{FF2B5EF4-FFF2-40B4-BE49-F238E27FC236}">
-                <a16:creationId xmlns:a16="http://schemas.microsoft.com/office/drawing/2014/main" id="{B1B7F84D-7B56-45B7-BF40-16AE2770E145}"/>
+                <a16:creationId xmlns:a16="http://schemas.microsoft.com/office/drawing/2014/main" xmlns="" id="{B1B7F84D-7B56-45B7-BF40-16AE2770E145}"/>
               </a:ext>
             </a:extLst>
           </p:cNvPr>
@@ -7748,7 +8401,7 @@
           <p:cNvPr id="3" name="Content Placeholder 2">
             <a:extLst>
               <a:ext uri="{FF2B5EF4-FFF2-40B4-BE49-F238E27FC236}">
-                <a16:creationId xmlns:a16="http://schemas.microsoft.com/office/drawing/2014/main" id="{E487FCA9-EC21-42D4-ACB8-F6C835C7B591}"/>
+                <a16:creationId xmlns:a16="http://schemas.microsoft.com/office/drawing/2014/main" xmlns="" id="{E487FCA9-EC21-42D4-ACB8-F6C835C7B591}"/>
               </a:ext>
             </a:extLst>
           </p:cNvPr>
@@ -7787,7 +8440,7 @@
           <p:cNvPr id="4" name="Content Placeholder 3">
             <a:extLst>
               <a:ext uri="{FF2B5EF4-FFF2-40B4-BE49-F238E27FC236}">
-                <a16:creationId xmlns:a16="http://schemas.microsoft.com/office/drawing/2014/main" id="{9FF95E9D-A54F-4BD4-B630-7DA5E03E5CDE}"/>
+                <a16:creationId xmlns:a16="http://schemas.microsoft.com/office/drawing/2014/main" xmlns="" id="{9FF95E9D-A54F-4BD4-B630-7DA5E03E5CDE}"/>
               </a:ext>
             </a:extLst>
           </p:cNvPr>
@@ -7815,7 +8468,7 @@
           <p:cNvPr id="5" name="Picture 4">
             <a:extLst>
               <a:ext uri="{FF2B5EF4-FFF2-40B4-BE49-F238E27FC236}">
-                <a16:creationId xmlns:a16="http://schemas.microsoft.com/office/drawing/2014/main" id="{A9F81249-58B6-4F4F-9144-3E6FF7F6FC7D}"/>
+                <a16:creationId xmlns:a16="http://schemas.microsoft.com/office/drawing/2014/main" xmlns="" id="{A9F81249-58B6-4F4F-9144-3E6FF7F6FC7D}"/>
               </a:ext>
             </a:extLst>
           </p:cNvPr>
@@ -7845,7 +8498,7 @@
           <p:cNvPr id="6" name="Picture 5">
             <a:extLst>
               <a:ext uri="{FF2B5EF4-FFF2-40B4-BE49-F238E27FC236}">
-                <a16:creationId xmlns:a16="http://schemas.microsoft.com/office/drawing/2014/main" id="{32A4BF5E-72F8-4CA6-AE72-7051AAE05ED2}"/>
+                <a16:creationId xmlns:a16="http://schemas.microsoft.com/office/drawing/2014/main" xmlns="" id="{32A4BF5E-72F8-4CA6-AE72-7051AAE05ED2}"/>
               </a:ext>
             </a:extLst>
           </p:cNvPr>
@@ -7905,7 +8558,7 @@
           <p:cNvPr id="2" name="Title 1">
             <a:extLst>
               <a:ext uri="{FF2B5EF4-FFF2-40B4-BE49-F238E27FC236}">
-                <a16:creationId xmlns:a16="http://schemas.microsoft.com/office/drawing/2014/main" id="{4DDB0165-A002-491A-A4DD-9CDBF64BB5EE}"/>
+                <a16:creationId xmlns:a16="http://schemas.microsoft.com/office/drawing/2014/main" xmlns="" id="{4DDB0165-A002-491A-A4DD-9CDBF64BB5EE}"/>
               </a:ext>
             </a:extLst>
           </p:cNvPr>
@@ -7938,7 +8591,7 @@
           <p:cNvPr id="6" name="Content Placeholder 5">
             <a:extLst>
               <a:ext uri="{FF2B5EF4-FFF2-40B4-BE49-F238E27FC236}">
-                <a16:creationId xmlns:a16="http://schemas.microsoft.com/office/drawing/2014/main" id="{5FF32F35-E962-45F5-9594-1820B90E6E5C}"/>
+                <a16:creationId xmlns:a16="http://schemas.microsoft.com/office/drawing/2014/main" xmlns="" id="{5FF32F35-E962-45F5-9594-1820B90E6E5C}"/>
               </a:ext>
             </a:extLst>
           </p:cNvPr>
@@ -8026,7 +8679,7 @@
           <p:cNvPr id="7" name="Picture 6">
             <a:extLst>
               <a:ext uri="{FF2B5EF4-FFF2-40B4-BE49-F238E27FC236}">
-                <a16:creationId xmlns:a16="http://schemas.microsoft.com/office/drawing/2014/main" id="{2E4F0A9D-5ECA-4576-B559-C39C3D455A31}"/>
+                <a16:creationId xmlns:a16="http://schemas.microsoft.com/office/drawing/2014/main" xmlns="" id="{2E4F0A9D-5ECA-4576-B559-C39C3D455A31}"/>
               </a:ext>
             </a:extLst>
           </p:cNvPr>
@@ -8086,7 +8739,7 @@
           <p:cNvPr id="2" name="Title 1">
             <a:extLst>
               <a:ext uri="{FF2B5EF4-FFF2-40B4-BE49-F238E27FC236}">
-                <a16:creationId xmlns:a16="http://schemas.microsoft.com/office/drawing/2014/main" id="{4DDB0165-A002-491A-A4DD-9CDBF64BB5EE}"/>
+                <a16:creationId xmlns:a16="http://schemas.microsoft.com/office/drawing/2014/main" xmlns="" id="{4DDB0165-A002-491A-A4DD-9CDBF64BB5EE}"/>
               </a:ext>
             </a:extLst>
           </p:cNvPr>
@@ -8119,7 +8772,7 @@
           <p:cNvPr id="6" name="Content Placeholder 5">
             <a:extLst>
               <a:ext uri="{FF2B5EF4-FFF2-40B4-BE49-F238E27FC236}">
-                <a16:creationId xmlns:a16="http://schemas.microsoft.com/office/drawing/2014/main" id="{5FF32F35-E962-45F5-9594-1820B90E6E5C}"/>
+                <a16:creationId xmlns:a16="http://schemas.microsoft.com/office/drawing/2014/main" xmlns="" id="{5FF32F35-E962-45F5-9594-1820B90E6E5C}"/>
               </a:ext>
             </a:extLst>
           </p:cNvPr>
@@ -8279,7 +8932,7 @@
           <p:cNvPr id="2" name="Title 1">
             <a:extLst>
               <a:ext uri="{FF2B5EF4-FFF2-40B4-BE49-F238E27FC236}">
-                <a16:creationId xmlns:a16="http://schemas.microsoft.com/office/drawing/2014/main" id="{4DDB0165-A002-491A-A4DD-9CDBF64BB5EE}"/>
+                <a16:creationId xmlns:a16="http://schemas.microsoft.com/office/drawing/2014/main" xmlns="" id="{4DDB0165-A002-491A-A4DD-9CDBF64BB5EE}"/>
               </a:ext>
             </a:extLst>
           </p:cNvPr>
@@ -8312,7 +8965,7 @@
           <p:cNvPr id="6" name="Content Placeholder 5">
             <a:extLst>
               <a:ext uri="{FF2B5EF4-FFF2-40B4-BE49-F238E27FC236}">
-                <a16:creationId xmlns:a16="http://schemas.microsoft.com/office/drawing/2014/main" id="{5FF32F35-E962-45F5-9594-1820B90E6E5C}"/>
+                <a16:creationId xmlns:a16="http://schemas.microsoft.com/office/drawing/2014/main" xmlns="" id="{5FF32F35-E962-45F5-9594-1820B90E6E5C}"/>
               </a:ext>
             </a:extLst>
           </p:cNvPr>
@@ -8434,7 +9087,7 @@
           <p:cNvPr id="2" name="Title 1">
             <a:extLst>
               <a:ext uri="{FF2B5EF4-FFF2-40B4-BE49-F238E27FC236}">
-                <a16:creationId xmlns:a16="http://schemas.microsoft.com/office/drawing/2014/main" id="{C3F67F27-63B2-4FA5-BD85-1D4A6DB52E11}"/>
+                <a16:creationId xmlns:a16="http://schemas.microsoft.com/office/drawing/2014/main" xmlns="" id="{C3F67F27-63B2-4FA5-BD85-1D4A6DB52E11}"/>
               </a:ext>
             </a:extLst>
           </p:cNvPr>
@@ -8468,7 +9121,7 @@
           <p:cNvPr id="3" name="Content Placeholder 2">
             <a:extLst>
               <a:ext uri="{FF2B5EF4-FFF2-40B4-BE49-F238E27FC236}">
-                <a16:creationId xmlns:a16="http://schemas.microsoft.com/office/drawing/2014/main" id="{C66A4D6F-F249-4C93-8704-AD872140A484}"/>
+                <a16:creationId xmlns:a16="http://schemas.microsoft.com/office/drawing/2014/main" xmlns="" id="{C66A4D6F-F249-4C93-8704-AD872140A484}"/>
               </a:ext>
             </a:extLst>
           </p:cNvPr>
@@ -8618,7 +9271,7 @@
           <p:cNvPr id="4" name="Content Placeholder 3">
             <a:extLst>
               <a:ext uri="{FF2B5EF4-FFF2-40B4-BE49-F238E27FC236}">
-                <a16:creationId xmlns:a16="http://schemas.microsoft.com/office/drawing/2014/main" id="{900456D2-A4C6-470B-B166-6DAE46A70ADF}"/>
+                <a16:creationId xmlns:a16="http://schemas.microsoft.com/office/drawing/2014/main" xmlns="" id="{900456D2-A4C6-470B-B166-6DAE46A70ADF}"/>
               </a:ext>
             </a:extLst>
           </p:cNvPr>

</xml_diff>